<commit_message>
renamed some namespaces and added examples for lecture 3 oop
</commit_message>
<xml_diff>
--- a/slides/studiecirkel_csharp_2.pptx
+++ b/slides/studiecirkel_csharp_2.pptx
@@ -13,7 +13,9 @@
     <p:sldId id="268" r:id="rId13"/>
     <p:sldId id="269" r:id="rId14"/>
     <p:sldId id="270" r:id="rId15"/>
-    <p:sldId id="266" r:id="rId16"/>
+    <p:sldId id="272" r:id="rId16"/>
+    <p:sldId id="271" r:id="rId17"/>
+    <p:sldId id="266" r:id="rId18"/>
   </p:sldIdLst>
   <p:sldSz cx="9144000" cy="6858000" type="screen4x3"/>
   <p:notesSz cx="6858000" cy="9144000"/>
@@ -7227,6 +7229,89 @@
 </p:sld>
 </file>
 
+<file path=ppt/slides/slide10.xml><?xml version="1.0" encoding="utf-8"?>
+<p:sld xmlns:a="http://schemas.openxmlformats.org/drawingml/2006/main" xmlns:r="http://schemas.openxmlformats.org/officeDocument/2006/relationships" xmlns:p="http://schemas.openxmlformats.org/presentationml/2006/main">
+  <p:cSld>
+    <p:spTree>
+      <p:nvGrpSpPr>
+        <p:cNvPr id="1" name=""/>
+        <p:cNvGrpSpPr/>
+        <p:nvPr/>
+      </p:nvGrpSpPr>
+      <p:grpSpPr>
+        <a:xfrm>
+          <a:off x="0" y="0"/>
+          <a:ext cx="0" cy="0"/>
+          <a:chOff x="0" y="0"/>
+          <a:chExt cx="0" cy="0"/>
+        </a:xfrm>
+      </p:grpSpPr>
+      <p:sp>
+        <p:nvSpPr>
+          <p:cNvPr id="2" name="Title 1"/>
+          <p:cNvSpPr>
+            <a:spLocks noGrp="1"/>
+          </p:cNvSpPr>
+          <p:nvPr>
+            <p:ph type="ctrTitle"/>
+          </p:nvPr>
+        </p:nvSpPr>
+        <p:spPr/>
+        <p:txBody>
+          <a:bodyPr/>
+          <a:lstStyle/>
+          <a:p>
+            <a:r>
+              <a:rPr lang="sv-SE" dirty="0" smtClean="0"/>
+              <a:t>Frågor? </a:t>
+            </a:r>
+            <a:r>
+              <a:rPr lang="sv-SE" smtClean="0"/>
+              <a:t>Åsikter?</a:t>
+            </a:r>
+            <a:endParaRPr lang="en-US" dirty="0"/>
+          </a:p>
+        </p:txBody>
+      </p:sp>
+      <p:sp>
+        <p:nvSpPr>
+          <p:cNvPr id="4" name="Subtitle 3"/>
+          <p:cNvSpPr>
+            <a:spLocks noGrp="1"/>
+          </p:cNvSpPr>
+          <p:nvPr>
+            <p:ph type="subTitle" idx="1"/>
+          </p:nvPr>
+        </p:nvSpPr>
+        <p:spPr/>
+        <p:txBody>
+          <a:bodyPr/>
+          <a:lstStyle/>
+          <a:p>
+            <a:endParaRPr lang="en-US"/>
+          </a:p>
+        </p:txBody>
+      </p:sp>
+    </p:spTree>
+    <p:extLst>
+      <p:ext uri="{BB962C8B-B14F-4D97-AF65-F5344CB8AC3E}">
+        <p14:creationId xmlns:p14="http://schemas.microsoft.com/office/powerpoint/2010/main" val="2561815442"/>
+      </p:ext>
+    </p:extLst>
+  </p:cSld>
+  <p:clrMapOvr>
+    <a:masterClrMapping/>
+  </p:clrMapOvr>
+  <p:timing>
+    <p:tnLst>
+      <p:par>
+        <p:cTn id="1" dur="indefinite" restart="never" nodeType="tmRoot"/>
+      </p:par>
+    </p:tnLst>
+  </p:timing>
+</p:sld>
+</file>
+
 <file path=ppt/slides/slide2.xml><?xml version="1.0" encoding="utf-8"?>
 <p:sld xmlns:a="http://schemas.openxmlformats.org/drawingml/2006/main" xmlns:r="http://schemas.openxmlformats.org/officeDocument/2006/relationships" xmlns:p="http://schemas.openxmlformats.org/presentationml/2006/main">
   <p:cSld>
@@ -7430,8 +7515,31 @@
             </a:pPr>
             <a:r>
               <a:rPr lang="sv-SE" dirty="0" smtClean="0"/>
-              <a:t>LINQ och funktionell programmering</a:t>
-            </a:r>
+              <a:t>LINQ och funktionell </a:t>
+            </a:r>
+            <a:r>
+              <a:rPr lang="sv-SE" dirty="0" smtClean="0"/>
+              <a:t>programmering</a:t>
+            </a:r>
+          </a:p>
+          <a:p>
+            <a:pPr marL="457200" indent="-457200">
+              <a:buFont typeface="+mj-lt"/>
+              <a:buAutoNum type="arabicPeriod"/>
+            </a:pPr>
+            <a:r>
+              <a:rPr lang="sv-SE" dirty="0" err="1" smtClean="0"/>
+              <a:t>Code</a:t>
+            </a:r>
+            <a:r>
+              <a:rPr lang="sv-SE" dirty="0" smtClean="0"/>
+              <a:t> </a:t>
+            </a:r>
+            <a:r>
+              <a:rPr lang="sv-SE" dirty="0" err="1" smtClean="0"/>
+              <a:t>smells</a:t>
+            </a:r>
+            <a:endParaRPr lang="sv-SE" dirty="0" smtClean="0"/>
           </a:p>
           <a:p>
             <a:pPr marL="457200" indent="-457200">
@@ -7697,6 +7805,13 @@
   <p:clrMapOvr>
     <a:masterClrMapping/>
   </p:clrMapOvr>
+  <p:timing>
+    <p:tnLst>
+      <p:par>
+        <p:cTn id="1" dur="indefinite" restart="never" nodeType="tmRoot"/>
+      </p:par>
+    </p:tnLst>
+  </p:timing>
 </p:sld>
 </file>
 
@@ -8366,6 +8481,13 @@
   <p:clrMapOvr>
     <a:masterClrMapping/>
   </p:clrMapOvr>
+  <p:timing>
+    <p:tnLst>
+      <p:par>
+        <p:cTn id="1" dur="indefinite" restart="never" nodeType="tmRoot"/>
+      </p:par>
+    </p:tnLst>
+  </p:timing>
 </p:sld>
 </file>
 
@@ -8438,6 +8560,13 @@
   <p:clrMapOvr>
     <a:masterClrMapping/>
   </p:clrMapOvr>
+  <p:timing>
+    <p:tnLst>
+      <p:par>
+        <p:cTn id="1" dur="indefinite" restart="never" nodeType="tmRoot"/>
+      </p:par>
+    </p:tnLst>
+  </p:timing>
 </p:sld>
 </file>
 
@@ -8465,7 +8594,7 @@
             <a:spLocks noGrp="1"/>
           </p:cNvSpPr>
           <p:nvPr>
-            <p:ph type="ctrTitle"/>
+            <p:ph type="title"/>
           </p:nvPr>
         </p:nvSpPr>
         <p:spPr/>
@@ -8475,24 +8604,20 @@
           <a:p>
             <a:r>
               <a:rPr lang="sv-SE" dirty="0" smtClean="0"/>
-              <a:t>Frågor? </a:t>
-            </a:r>
-            <a:r>
-              <a:rPr lang="sv-SE" smtClean="0"/>
-              <a:t>Åsikter?</a:t>
-            </a:r>
-            <a:endParaRPr lang="en-US" dirty="0"/>
-          </a:p>
-        </p:txBody>
-      </p:sp>
-      <p:sp>
-        <p:nvSpPr>
-          <p:cNvPr id="4" name="Subtitle 3"/>
-          <p:cNvSpPr>
-            <a:spLocks noGrp="1"/>
-          </p:cNvSpPr>
-          <p:nvPr>
-            <p:ph type="subTitle" idx="1"/>
+              <a:t>Sammanfattning</a:t>
+            </a:r>
+            <a:endParaRPr lang="sv-SE" dirty="0"/>
+          </a:p>
+        </p:txBody>
+      </p:sp>
+      <p:sp>
+        <p:nvSpPr>
+          <p:cNvPr id="3" name="Content Placeholder 2"/>
+          <p:cNvSpPr>
+            <a:spLocks noGrp="1"/>
+          </p:cNvSpPr>
+          <p:nvPr>
+            <p:ph idx="1"/>
           </p:nvPr>
         </p:nvSpPr>
         <p:spPr/>
@@ -8500,14 +8625,231 @@
           <a:bodyPr/>
           <a:lstStyle/>
           <a:p>
-            <a:endParaRPr lang="en-US"/>
+            <a:r>
+              <a:rPr lang="sv-SE" dirty="0" smtClean="0"/>
+              <a:t>Varför?</a:t>
+            </a:r>
+          </a:p>
+          <a:p>
+            <a:r>
+              <a:rPr lang="sv-SE" dirty="0" smtClean="0"/>
+              <a:t>Varför inte?</a:t>
+            </a:r>
           </a:p>
         </p:txBody>
       </p:sp>
     </p:spTree>
     <p:extLst>
       <p:ext uri="{BB962C8B-B14F-4D97-AF65-F5344CB8AC3E}">
-        <p14:creationId xmlns:p14="http://schemas.microsoft.com/office/powerpoint/2010/main" val="2561815442"/>
+        <p14:creationId xmlns:p14="http://schemas.microsoft.com/office/powerpoint/2010/main" val="3573327688"/>
+      </p:ext>
+    </p:extLst>
+  </p:cSld>
+  <p:clrMapOvr>
+    <a:masterClrMapping/>
+  </p:clrMapOvr>
+  <p:timing>
+    <p:tnLst>
+      <p:par>
+        <p:cTn id="1" dur="indefinite" restart="never" nodeType="tmRoot"/>
+      </p:par>
+    </p:tnLst>
+  </p:timing>
+</p:sld>
+</file>
+
+<file path=ppt/slides/slide9.xml><?xml version="1.0" encoding="utf-8"?>
+<p:sld xmlns:a="http://schemas.openxmlformats.org/drawingml/2006/main" xmlns:r="http://schemas.openxmlformats.org/officeDocument/2006/relationships" xmlns:p="http://schemas.openxmlformats.org/presentationml/2006/main">
+  <p:cSld>
+    <p:spTree>
+      <p:nvGrpSpPr>
+        <p:cNvPr id="1" name=""/>
+        <p:cNvGrpSpPr/>
+        <p:nvPr/>
+      </p:nvGrpSpPr>
+      <p:grpSpPr>
+        <a:xfrm>
+          <a:off x="0" y="0"/>
+          <a:ext cx="0" cy="0"/>
+          <a:chOff x="0" y="0"/>
+          <a:chExt cx="0" cy="0"/>
+        </a:xfrm>
+      </p:grpSpPr>
+      <p:sp>
+        <p:nvSpPr>
+          <p:cNvPr id="3" name="Content Placeholder 2"/>
+          <p:cNvSpPr>
+            <a:spLocks noGrp="1"/>
+          </p:cNvSpPr>
+          <p:nvPr>
+            <p:ph idx="1"/>
+          </p:nvPr>
+        </p:nvSpPr>
+        <p:spPr/>
+        <p:txBody>
+          <a:bodyPr/>
+          <a:lstStyle/>
+          <a:p>
+            <a:endParaRPr lang="sv-SE" dirty="0"/>
+          </a:p>
+        </p:txBody>
+      </p:sp>
+      <p:pic>
+        <p:nvPicPr>
+          <p:cNvPr id="1026" name="Picture 2"/>
+          <p:cNvPicPr>
+            <a:picLocks noChangeAspect="1" noChangeArrowheads="1"/>
+          </p:cNvPicPr>
+          <p:nvPr/>
+        </p:nvPicPr>
+        <p:blipFill>
+          <a:blip r:embed="rId2">
+            <a:extLst>
+              <a:ext uri="{28A0092B-C50C-407E-A947-70E740481C1C}">
+                <a14:useLocalDpi xmlns:a14="http://schemas.microsoft.com/office/drawing/2010/main" val="0"/>
+              </a:ext>
+            </a:extLst>
+          </a:blip>
+          <a:srcRect/>
+          <a:stretch>
+            <a:fillRect/>
+          </a:stretch>
+        </p:blipFill>
+        <p:spPr bwMode="auto">
+          <a:xfrm>
+            <a:off x="107504" y="1003548"/>
+            <a:ext cx="9016603" cy="4441676"/>
+          </a:xfrm>
+          <a:prstGeom prst="rect">
+            <a:avLst/>
+          </a:prstGeom>
+          <a:noFill/>
+          <a:ln>
+            <a:noFill/>
+          </a:ln>
+          <a:effectLst/>
+          <a:extLst>
+            <a:ext uri="{909E8E84-426E-40DD-AFC4-6F175D3DCCD1}">
+              <a14:hiddenFill xmlns:a14="http://schemas.microsoft.com/office/drawing/2010/main">
+                <a:solidFill>
+                  <a:schemeClr val="accent1"/>
+                </a:solidFill>
+              </a14:hiddenFill>
+            </a:ext>
+            <a:ext uri="{91240B29-F687-4F45-9708-019B960494DF}">
+              <a14:hiddenLine xmlns:a14="http://schemas.microsoft.com/office/drawing/2010/main" w="9525">
+                <a:solidFill>
+                  <a:schemeClr val="tx1"/>
+                </a:solidFill>
+                <a:miter lim="800000"/>
+                <a:headEnd/>
+                <a:tailEnd/>
+              </a14:hiddenLine>
+            </a:ext>
+            <a:ext uri="{AF507438-7753-43E0-B8FC-AC1667EBCBE1}">
+              <a14:hiddenEffects xmlns:a14="http://schemas.microsoft.com/office/drawing/2010/main">
+                <a:effectLst>
+                  <a:outerShdw dist="35921" dir="2700000" algn="ctr" rotWithShape="0">
+                    <a:schemeClr val="bg2"/>
+                  </a:outerShdw>
+                </a:effectLst>
+              </a14:hiddenEffects>
+            </a:ext>
+          </a:extLst>
+        </p:spPr>
+      </p:pic>
+      <p:sp>
+        <p:nvSpPr>
+          <p:cNvPr id="4" name="Oval 3"/>
+          <p:cNvSpPr/>
+          <p:nvPr/>
+        </p:nvSpPr>
+        <p:spPr>
+          <a:xfrm>
+            <a:off x="251520" y="764704"/>
+            <a:ext cx="2160240" cy="720080"/>
+          </a:xfrm>
+          <a:prstGeom prst="ellipse">
+            <a:avLst/>
+          </a:prstGeom>
+          <a:noFill/>
+          <a:ln w="19050">
+            <a:solidFill>
+              <a:srgbClr val="FF0000"/>
+            </a:solidFill>
+          </a:ln>
+        </p:spPr>
+        <p:style>
+          <a:lnRef idx="1">
+            <a:schemeClr val="accent1"/>
+          </a:lnRef>
+          <a:fillRef idx="3">
+            <a:schemeClr val="accent1"/>
+          </a:fillRef>
+          <a:effectRef idx="2">
+            <a:schemeClr val="accent1"/>
+          </a:effectRef>
+          <a:fontRef idx="minor">
+            <a:schemeClr val="lt1"/>
+          </a:fontRef>
+        </p:style>
+        <p:txBody>
+          <a:bodyPr rtlCol="0" anchor="ctr"/>
+          <a:lstStyle/>
+          <a:p>
+            <a:pPr algn="ctr"/>
+            <a:endParaRPr lang="sv-SE"/>
+          </a:p>
+        </p:txBody>
+      </p:sp>
+      <p:sp>
+        <p:nvSpPr>
+          <p:cNvPr id="6" name="Oval 5"/>
+          <p:cNvSpPr/>
+          <p:nvPr/>
+        </p:nvSpPr>
+        <p:spPr>
+          <a:xfrm>
+            <a:off x="2123728" y="2636912"/>
+            <a:ext cx="2160240" cy="720080"/>
+          </a:xfrm>
+          <a:prstGeom prst="ellipse">
+            <a:avLst/>
+          </a:prstGeom>
+          <a:noFill/>
+          <a:ln w="19050">
+            <a:solidFill>
+              <a:srgbClr val="FF0000"/>
+            </a:solidFill>
+          </a:ln>
+        </p:spPr>
+        <p:style>
+          <a:lnRef idx="1">
+            <a:schemeClr val="accent1"/>
+          </a:lnRef>
+          <a:fillRef idx="3">
+            <a:schemeClr val="accent1"/>
+          </a:fillRef>
+          <a:effectRef idx="2">
+            <a:schemeClr val="accent1"/>
+          </a:effectRef>
+          <a:fontRef idx="minor">
+            <a:schemeClr val="lt1"/>
+          </a:fontRef>
+        </p:style>
+        <p:txBody>
+          <a:bodyPr rtlCol="0" anchor="ctr"/>
+          <a:lstStyle/>
+          <a:p>
+            <a:pPr algn="ctr"/>
+            <a:endParaRPr lang="sv-SE"/>
+          </a:p>
+        </p:txBody>
+      </p:sp>
+    </p:spTree>
+    <p:extLst>
+      <p:ext uri="{BB962C8B-B14F-4D97-AF65-F5344CB8AC3E}">
+        <p14:creationId xmlns:p14="http://schemas.microsoft.com/office/powerpoint/2010/main" val="1345042046"/>
       </p:ext>
     </p:extLst>
   </p:cSld>
@@ -9161,13 +9503,7 @@
 </file>
 
 <file path=customXml/item1.xml><?xml version="1.0" encoding="utf-8"?>
-<?mso-contentType ?>
-<p:Policy xmlns:p="office.server.policy" id="" local="true">
-  <p:Name>Document</p:Name>
-  <p:Description/>
-  <p:Statement/>
-  <p:PolicyItems/>
-</p:Policy>
+<LongProperties xmlns="http://schemas.microsoft.com/office/2006/metadata/longProperties"/>
 </file>
 
 <file path=customXml/item2.xml><?xml version="1.0" encoding="utf-8"?>
@@ -9193,10 +9529,161 @@
 </file>
 
 <file path=customXml/item3.xml><?xml version="1.0" encoding="utf-8"?>
-<LongProperties xmlns="http://schemas.microsoft.com/office/2006/metadata/longProperties"/>
+<?mso-contentType ?>
+<p:Policy xmlns:p="office.server.policy" id="" local="true">
+  <p:Name>Document</p:Name>
+  <p:Description/>
+  <p:Statement/>
+  <p:PolicyItems/>
+</p:Policy>
 </file>
 
 <file path=customXml/item4.xml><?xml version="1.0" encoding="utf-8"?>
+<?mso-contentType ?>
+<spe:Receivers xmlns:spe="http://schemas.microsoft.com/sharepoint/events">
+  <Receiver>
+    <Name>Document ID Generator</Name>
+    <Synchronization>Synchronous</Synchronization>
+    <Type>10001</Type>
+    <SequenceNumber>1000</SequenceNumber>
+    <Assembly>Microsoft.Office.DocumentManagement, Version=14.0.0.0, Culture=neutral, PublicKeyToken=71e9bce111e9429c</Assembly>
+    <Class>Microsoft.Office.DocumentManagement.Internal.DocIdHandler</Class>
+    <Data/>
+    <Filter/>
+  </Receiver>
+  <Receiver>
+    <Name>Document ID Generator</Name>
+    <Synchronization>Synchronous</Synchronization>
+    <Type>10002</Type>
+    <SequenceNumber>1001</SequenceNumber>
+    <Assembly>Microsoft.Office.DocumentManagement, Version=14.0.0.0, Culture=neutral, PublicKeyToken=71e9bce111e9429c</Assembly>
+    <Class>Microsoft.Office.DocumentManagement.Internal.DocIdHandler</Class>
+    <Data/>
+    <Filter/>
+  </Receiver>
+  <Receiver>
+    <Name>Document ID Generator</Name>
+    <Synchronization>Synchronous</Synchronization>
+    <Type>10004</Type>
+    <SequenceNumber>1002</SequenceNumber>
+    <Assembly>Microsoft.Office.DocumentManagement, Version=14.0.0.0, Culture=neutral, PublicKeyToken=71e9bce111e9429c</Assembly>
+    <Class>Microsoft.Office.DocumentManagement.Internal.DocIdHandler</Class>
+    <Data/>
+    <Filter/>
+  </Receiver>
+  <Receiver>
+    <Name>Document ID Generator</Name>
+    <Synchronization>Synchronous</Synchronization>
+    <Type>10006</Type>
+    <SequenceNumber>1003</SequenceNumber>
+    <Assembly>Microsoft.Office.DocumentManagement, Version=14.0.0.0, Culture=neutral, PublicKeyToken=71e9bce111e9429c</Assembly>
+    <Class>Microsoft.Office.DocumentManagement.Internal.DocIdHandler</Class>
+    <Data/>
+    <Filter/>
+  </Receiver>
+  <Receiver>
+    <Name>Policy Label Generator</Name>
+    <Synchronization>Synchronous</Synchronization>
+    <Type>10001</Type>
+    <SequenceNumber>1000</SequenceNumber>
+    <Assembly>Microsoft.Office.Policy, Version=14.0.0.0, Culture=neutral, PublicKeyToken=71e9bce111e9429c</Assembly>
+    <Class>Microsoft.Office.RecordsManagement.Internal.LabelHandler</Class>
+    <Data/>
+    <Filter/>
+  </Receiver>
+  <Receiver>
+    <Name>Policy Label Generator</Name>
+    <Synchronization>Synchronous</Synchronization>
+    <Type>10002</Type>
+    <SequenceNumber>1001</SequenceNumber>
+    <Assembly>Microsoft.Office.Policy, Version=14.0.0.0, Culture=neutral, PublicKeyToken=71e9bce111e9429c</Assembly>
+    <Class>Microsoft.Office.RecordsManagement.Internal.LabelHandler</Class>
+    <Data/>
+    <Filter/>
+  </Receiver>
+  <Receiver>
+    <Name>Policy Label Generator</Name>
+    <Synchronization>Synchronous</Synchronization>
+    <Type>10004</Type>
+    <SequenceNumber>1002</SequenceNumber>
+    <Assembly>Microsoft.Office.Policy, Version=14.0.0.0, Culture=neutral, PublicKeyToken=71e9bce111e9429c</Assembly>
+    <Class>Microsoft.Office.RecordsManagement.Internal.LabelHandler</Class>
+    <Data/>
+    <Filter/>
+  </Receiver>
+  <Receiver>
+    <Name>Policy Label Generator</Name>
+    <Synchronization>Synchronous</Synchronization>
+    <Type>10006</Type>
+    <SequenceNumber>1003</SequenceNumber>
+    <Assembly>Microsoft.Office.Policy, Version=14.0.0.0, Culture=neutral, PublicKeyToken=71e9bce111e9429c</Assembly>
+    <Class>Microsoft.Office.RecordsManagement.Internal.LabelHandler</Class>
+    <Data/>
+    <Filter/>
+  </Receiver>
+  <Receiver>
+    <Name>Microsoft.Office.RecordsManagement.PolicyFeatures.ExpirationEventReceiver</Name>
+    <Synchronization>Synchronous</Synchronization>
+    <Type>10001</Type>
+    <SequenceNumber>101</SequenceNumber>
+    <Assembly>Microsoft.Office.Policy, Version=14.0.0.0, Culture=neutral, PublicKeyToken=71e9bce111e9429c</Assembly>
+    <Class>Microsoft.Office.RecordsManagement.Internal.UpdateExpireDate</Class>
+    <Data/>
+    <Filter/>
+  </Receiver>
+  <Receiver>
+    <Name>Microsoft.Office.RecordsManagement.PolicyFeatures.ExpirationEventReceiver</Name>
+    <Synchronization>Synchronous</Synchronization>
+    <Type>10002</Type>
+    <SequenceNumber>102</SequenceNumber>
+    <Assembly>Microsoft.Office.Policy, Version=14.0.0.0, Culture=neutral, PublicKeyToken=71e9bce111e9429c</Assembly>
+    <Class>Microsoft.Office.RecordsManagement.Internal.UpdateExpireDate</Class>
+    <Data/>
+    <Filter/>
+  </Receiver>
+  <Receiver>
+    <Name>Microsoft.Office.RecordsManagement.PolicyFeatures.ExpirationEventReceiver</Name>
+    <Synchronization>Synchronous</Synchronization>
+    <Type>10004</Type>
+    <SequenceNumber>103</SequenceNumber>
+    <Assembly>Microsoft.Office.Policy, Version=14.0.0.0, Culture=neutral, PublicKeyToken=71e9bce111e9429c</Assembly>
+    <Class>Microsoft.Office.RecordsManagement.Internal.UpdateExpireDate</Class>
+    <Data/>
+    <Filter/>
+  </Receiver>
+  <Receiver>
+    <Name>Microsoft.Office.RecordsManagement.PolicyFeatures.ExpirationEventReceiver</Name>
+    <Synchronization>Synchronous</Synchronization>
+    <Type>10006</Type>
+    <SequenceNumber>104</SequenceNumber>
+    <Assembly>Microsoft.Office.Policy, Version=14.0.0.0, Culture=neutral, PublicKeyToken=71e9bce111e9429c</Assembly>
+    <Class>Microsoft.Office.RecordsManagement.Internal.UpdateExpireDate</Class>
+    <Data/>
+    <Filter/>
+  </Receiver>
+  <Receiver>
+    <Name>Microsoft.Office.RecordsManagement.PolicyFeatures.ExpirationEventReceiver</Name>
+    <Synchronization>Synchronous</Synchronization>
+    <Type>10009</Type>
+    <SequenceNumber>105</SequenceNumber>
+    <Assembly>Microsoft.Office.Policy, Version=14.0.0.0, Culture=neutral, PublicKeyToken=71e9bce111e9429c</Assembly>
+    <Class>Microsoft.Office.RecordsManagement.Internal.UpdateExpireDate</Class>
+    <Data/>
+    <Filter/>
+  </Receiver>
+</spe:Receivers>
+</file>
+
+<file path=customXml/item5.xml><?xml version="1.0" encoding="utf-8"?>
+<?mso-contentType ?>
+<FormTemplates xmlns="http://schemas.microsoft.com/sharepoint/v3/contenttype/forms">
+  <Display>DocumentLibraryForm</Display>
+  <Edit>DocumentLibraryForm</Edit>
+  <New>DocumentLibraryForm</New>
+</FormTemplates>
+</file>
+
+<file path=customXml/item6.xml><?xml version="1.0" encoding="utf-8"?>
 <ct:contentTypeSchema xmlns:ct="http://schemas.microsoft.com/office/2006/metadata/contentType" xmlns:ma="http://schemas.microsoft.com/office/2006/metadata/properties/metaAttributes" ct:_="" ma:_="" ma:contentTypeName="Sigma Presentation" ma:contentTypeID="0x010100CC38F04C2C9F0F47AC0C9711C66D07D1060054B2F8436FFED64480363C99CE4DCE5B" ma:contentTypeVersion="40" ma:contentTypeDescription="" ma:contentTypeScope="" ma:versionID="05c892b335d817181605d5d7adf23ed8">
   <xsd:schema xmlns:xsd="http://www.w3.org/2001/XMLSchema" xmlns:xs="http://www.w3.org/2001/XMLSchema" xmlns:p="http://schemas.microsoft.com/office/2006/metadata/properties" xmlns:ns1="http://schemas.microsoft.com/sharepoint/v3" xmlns:ns2="ab86c710-d5b9-443b-89bd-d84ca3c43036" targetNamespace="http://schemas.microsoft.com/office/2006/metadata/properties" ma:root="true" ma:fieldsID="8fa4d11be89b3571519139ff854dbb47" ns1:_="" ns2:_="">
     <xsd:import namespace="http://schemas.microsoft.com/sharepoint/v3"/>
@@ -9404,155 +9891,10 @@
 </ct:contentTypeSchema>
 </file>
 
-<file path=customXml/item5.xml><?xml version="1.0" encoding="utf-8"?>
-<?mso-contentType ?>
-<FormTemplates xmlns="http://schemas.microsoft.com/sharepoint/v3/contenttype/forms">
-  <Display>DocumentLibraryForm</Display>
-  <Edit>DocumentLibraryForm</Edit>
-  <New>DocumentLibraryForm</New>
-</FormTemplates>
-</file>
-
-<file path=customXml/item6.xml><?xml version="1.0" encoding="utf-8"?>
-<?mso-contentType ?>
-<spe:Receivers xmlns:spe="http://schemas.microsoft.com/sharepoint/events">
-  <Receiver>
-    <Name>Document ID Generator</Name>
-    <Synchronization>Synchronous</Synchronization>
-    <Type>10001</Type>
-    <SequenceNumber>1000</SequenceNumber>
-    <Assembly>Microsoft.Office.DocumentManagement, Version=14.0.0.0, Culture=neutral, PublicKeyToken=71e9bce111e9429c</Assembly>
-    <Class>Microsoft.Office.DocumentManagement.Internal.DocIdHandler</Class>
-    <Data/>
-    <Filter/>
-  </Receiver>
-  <Receiver>
-    <Name>Document ID Generator</Name>
-    <Synchronization>Synchronous</Synchronization>
-    <Type>10002</Type>
-    <SequenceNumber>1001</SequenceNumber>
-    <Assembly>Microsoft.Office.DocumentManagement, Version=14.0.0.0, Culture=neutral, PublicKeyToken=71e9bce111e9429c</Assembly>
-    <Class>Microsoft.Office.DocumentManagement.Internal.DocIdHandler</Class>
-    <Data/>
-    <Filter/>
-  </Receiver>
-  <Receiver>
-    <Name>Document ID Generator</Name>
-    <Synchronization>Synchronous</Synchronization>
-    <Type>10004</Type>
-    <SequenceNumber>1002</SequenceNumber>
-    <Assembly>Microsoft.Office.DocumentManagement, Version=14.0.0.0, Culture=neutral, PublicKeyToken=71e9bce111e9429c</Assembly>
-    <Class>Microsoft.Office.DocumentManagement.Internal.DocIdHandler</Class>
-    <Data/>
-    <Filter/>
-  </Receiver>
-  <Receiver>
-    <Name>Document ID Generator</Name>
-    <Synchronization>Synchronous</Synchronization>
-    <Type>10006</Type>
-    <SequenceNumber>1003</SequenceNumber>
-    <Assembly>Microsoft.Office.DocumentManagement, Version=14.0.0.0, Culture=neutral, PublicKeyToken=71e9bce111e9429c</Assembly>
-    <Class>Microsoft.Office.DocumentManagement.Internal.DocIdHandler</Class>
-    <Data/>
-    <Filter/>
-  </Receiver>
-  <Receiver>
-    <Name>Policy Label Generator</Name>
-    <Synchronization>Synchronous</Synchronization>
-    <Type>10001</Type>
-    <SequenceNumber>1000</SequenceNumber>
-    <Assembly>Microsoft.Office.Policy, Version=14.0.0.0, Culture=neutral, PublicKeyToken=71e9bce111e9429c</Assembly>
-    <Class>Microsoft.Office.RecordsManagement.Internal.LabelHandler</Class>
-    <Data/>
-    <Filter/>
-  </Receiver>
-  <Receiver>
-    <Name>Policy Label Generator</Name>
-    <Synchronization>Synchronous</Synchronization>
-    <Type>10002</Type>
-    <SequenceNumber>1001</SequenceNumber>
-    <Assembly>Microsoft.Office.Policy, Version=14.0.0.0, Culture=neutral, PublicKeyToken=71e9bce111e9429c</Assembly>
-    <Class>Microsoft.Office.RecordsManagement.Internal.LabelHandler</Class>
-    <Data/>
-    <Filter/>
-  </Receiver>
-  <Receiver>
-    <Name>Policy Label Generator</Name>
-    <Synchronization>Synchronous</Synchronization>
-    <Type>10004</Type>
-    <SequenceNumber>1002</SequenceNumber>
-    <Assembly>Microsoft.Office.Policy, Version=14.0.0.0, Culture=neutral, PublicKeyToken=71e9bce111e9429c</Assembly>
-    <Class>Microsoft.Office.RecordsManagement.Internal.LabelHandler</Class>
-    <Data/>
-    <Filter/>
-  </Receiver>
-  <Receiver>
-    <Name>Policy Label Generator</Name>
-    <Synchronization>Synchronous</Synchronization>
-    <Type>10006</Type>
-    <SequenceNumber>1003</SequenceNumber>
-    <Assembly>Microsoft.Office.Policy, Version=14.0.0.0, Culture=neutral, PublicKeyToken=71e9bce111e9429c</Assembly>
-    <Class>Microsoft.Office.RecordsManagement.Internal.LabelHandler</Class>
-    <Data/>
-    <Filter/>
-  </Receiver>
-  <Receiver>
-    <Name>Microsoft.Office.RecordsManagement.PolicyFeatures.ExpirationEventReceiver</Name>
-    <Synchronization>Synchronous</Synchronization>
-    <Type>10001</Type>
-    <SequenceNumber>101</SequenceNumber>
-    <Assembly>Microsoft.Office.Policy, Version=14.0.0.0, Culture=neutral, PublicKeyToken=71e9bce111e9429c</Assembly>
-    <Class>Microsoft.Office.RecordsManagement.Internal.UpdateExpireDate</Class>
-    <Data/>
-    <Filter/>
-  </Receiver>
-  <Receiver>
-    <Name>Microsoft.Office.RecordsManagement.PolicyFeatures.ExpirationEventReceiver</Name>
-    <Synchronization>Synchronous</Synchronization>
-    <Type>10002</Type>
-    <SequenceNumber>102</SequenceNumber>
-    <Assembly>Microsoft.Office.Policy, Version=14.0.0.0, Culture=neutral, PublicKeyToken=71e9bce111e9429c</Assembly>
-    <Class>Microsoft.Office.RecordsManagement.Internal.UpdateExpireDate</Class>
-    <Data/>
-    <Filter/>
-  </Receiver>
-  <Receiver>
-    <Name>Microsoft.Office.RecordsManagement.PolicyFeatures.ExpirationEventReceiver</Name>
-    <Synchronization>Synchronous</Synchronization>
-    <Type>10004</Type>
-    <SequenceNumber>103</SequenceNumber>
-    <Assembly>Microsoft.Office.Policy, Version=14.0.0.0, Culture=neutral, PublicKeyToken=71e9bce111e9429c</Assembly>
-    <Class>Microsoft.Office.RecordsManagement.Internal.UpdateExpireDate</Class>
-    <Data/>
-    <Filter/>
-  </Receiver>
-  <Receiver>
-    <Name>Microsoft.Office.RecordsManagement.PolicyFeatures.ExpirationEventReceiver</Name>
-    <Synchronization>Synchronous</Synchronization>
-    <Type>10006</Type>
-    <SequenceNumber>104</SequenceNumber>
-    <Assembly>Microsoft.Office.Policy, Version=14.0.0.0, Culture=neutral, PublicKeyToken=71e9bce111e9429c</Assembly>
-    <Class>Microsoft.Office.RecordsManagement.Internal.UpdateExpireDate</Class>
-    <Data/>
-    <Filter/>
-  </Receiver>
-  <Receiver>
-    <Name>Microsoft.Office.RecordsManagement.PolicyFeatures.ExpirationEventReceiver</Name>
-    <Synchronization>Synchronous</Synchronization>
-    <Type>10009</Type>
-    <SequenceNumber>105</SequenceNumber>
-    <Assembly>Microsoft.Office.Policy, Version=14.0.0.0, Culture=neutral, PublicKeyToken=71e9bce111e9429c</Assembly>
-    <Class>Microsoft.Office.RecordsManagement.Internal.UpdateExpireDate</Class>
-    <Data/>
-    <Filter/>
-  </Receiver>
-</spe:Receivers>
-</file>
-
 <file path=customXml/itemProps1.xml><?xml version="1.0" encoding="utf-8"?>
-<ds:datastoreItem xmlns:ds="http://schemas.openxmlformats.org/officeDocument/2006/customXml" ds:itemID="{4B40B3D7-3BF4-4F81-B752-465C7873F42D}">
+<ds:datastoreItem xmlns:ds="http://schemas.openxmlformats.org/officeDocument/2006/customXml" ds:itemID="{451EFAB2-D9E5-4914-B3CF-18B40C6146D6}">
   <ds:schemaRefs>
-    <ds:schemaRef ds:uri="office.server.policy"/>
+    <ds:schemaRef ds:uri="http://schemas.microsoft.com/office/2006/metadata/longProperties"/>
   </ds:schemaRefs>
 </ds:datastoreItem>
 </file>
@@ -9567,14 +9909,30 @@
 </file>
 
 <file path=customXml/itemProps3.xml><?xml version="1.0" encoding="utf-8"?>
-<ds:datastoreItem xmlns:ds="http://schemas.openxmlformats.org/officeDocument/2006/customXml" ds:itemID="{451EFAB2-D9E5-4914-B3CF-18B40C6146D6}">
+<ds:datastoreItem xmlns:ds="http://schemas.openxmlformats.org/officeDocument/2006/customXml" ds:itemID="{4B40B3D7-3BF4-4F81-B752-465C7873F42D}">
   <ds:schemaRefs>
-    <ds:schemaRef ds:uri="http://schemas.microsoft.com/office/2006/metadata/longProperties"/>
+    <ds:schemaRef ds:uri="office.server.policy"/>
   </ds:schemaRefs>
 </ds:datastoreItem>
 </file>
 
 <file path=customXml/itemProps4.xml><?xml version="1.0" encoding="utf-8"?>
+<ds:datastoreItem xmlns:ds="http://schemas.openxmlformats.org/officeDocument/2006/customXml" ds:itemID="{B8F9EEAE-CAA6-4862-920C-A5F615204F2A}">
+  <ds:schemaRefs>
+    <ds:schemaRef ds:uri="http://schemas.microsoft.com/sharepoint/events"/>
+  </ds:schemaRefs>
+</ds:datastoreItem>
+</file>
+
+<file path=customXml/itemProps5.xml><?xml version="1.0" encoding="utf-8"?>
+<ds:datastoreItem xmlns:ds="http://schemas.openxmlformats.org/officeDocument/2006/customXml" ds:itemID="{FA7F1BD2-EEB7-4CA7-AE76-FFA9743A6424}">
+  <ds:schemaRefs>
+    <ds:schemaRef ds:uri="http://schemas.microsoft.com/sharepoint/v3/contenttype/forms"/>
+  </ds:schemaRefs>
+</ds:datastoreItem>
+</file>
+
+<file path=customXml/itemProps6.xml><?xml version="1.0" encoding="utf-8"?>
 <ds:datastoreItem xmlns:ds="http://schemas.openxmlformats.org/officeDocument/2006/customXml" ds:itemID="{872CE3A9-A133-4832-B653-8001D90DA093}">
   <ds:schemaRefs>
     <ds:schemaRef ds:uri="http://schemas.microsoft.com/office/2006/metadata/contentType"/>
@@ -9591,20 +9949,4 @@
     <ds:schemaRef ds:uri="http://schemas.microsoft.com/internal/obd"/>
   </ds:schemaRefs>
 </ds:datastoreItem>
-</file>
-
-<file path=customXml/itemProps5.xml><?xml version="1.0" encoding="utf-8"?>
-<ds:datastoreItem xmlns:ds="http://schemas.openxmlformats.org/officeDocument/2006/customXml" ds:itemID="{FA7F1BD2-EEB7-4CA7-AE76-FFA9743A6424}">
-  <ds:schemaRefs>
-    <ds:schemaRef ds:uri="http://schemas.microsoft.com/sharepoint/v3/contenttype/forms"/>
-  </ds:schemaRefs>
-</ds:datastoreItem>
-</file>
-
-<file path=customXml/itemProps6.xml><?xml version="1.0" encoding="utf-8"?>
-<ds:datastoreItem xmlns:ds="http://schemas.openxmlformats.org/officeDocument/2006/customXml" ds:itemID="{B8F9EEAE-CAA6-4862-920C-A5F615204F2A}">
-  <ds:schemaRefs>
-    <ds:schemaRef ds:uri="http://schemas.microsoft.com/sharepoint/events"/>
-  </ds:schemaRefs>
-</ds:datastoreItem>
 </file>
</xml_diff>